<commit_message>
aftr images were updated by Gorohovsky
</commit_message>
<xml_diff>
--- a/images/aftr_synplot_wo_tta.pptx
+++ b/images/aftr_synplot_wo_tta.pptx
@@ -10,14 +10,14 @@
   <p:sldIdLst>
     <p:sldId id="256" r:id="rId2"/>
   </p:sldIdLst>
-  <p:sldSz cx="10058400" cy="2743200"/>
+  <p:sldSz cx="3240088" cy="5759450"/>
   <p:notesSz cx="6858000" cy="9144000"/>
   <p:defaultTextStyle>
     <a:defPPr>
       <a:defRPr lang="en-US"/>
     </a:defPPr>
-    <a:lvl1pPr marL="0" algn="l" defTabSz="229962" rtl="0" eaLnBrk="1" latinLnBrk="0" hangingPunct="1">
-      <a:defRPr sz="951" kern="1200">
+    <a:lvl1pPr marL="0" algn="l" defTabSz="212899" rtl="0" eaLnBrk="1" latinLnBrk="0" hangingPunct="1">
+      <a:defRPr sz="880" kern="1200">
         <a:solidFill>
           <a:schemeClr val="tx1"/>
         </a:solidFill>
@@ -26,8 +26,8 @@
         <a:cs typeface="+mn-cs"/>
       </a:defRPr>
     </a:lvl1pPr>
-    <a:lvl2pPr marL="229962" algn="l" defTabSz="229962" rtl="0" eaLnBrk="1" latinLnBrk="0" hangingPunct="1">
-      <a:defRPr sz="951" kern="1200">
+    <a:lvl2pPr marL="212899" algn="l" defTabSz="212899" rtl="0" eaLnBrk="1" latinLnBrk="0" hangingPunct="1">
+      <a:defRPr sz="880" kern="1200">
         <a:solidFill>
           <a:schemeClr val="tx1"/>
         </a:solidFill>
@@ -36,8 +36,8 @@
         <a:cs typeface="+mn-cs"/>
       </a:defRPr>
     </a:lvl2pPr>
-    <a:lvl3pPr marL="459927" algn="l" defTabSz="229962" rtl="0" eaLnBrk="1" latinLnBrk="0" hangingPunct="1">
-      <a:defRPr sz="951" kern="1200">
+    <a:lvl3pPr marL="425800" algn="l" defTabSz="212899" rtl="0" eaLnBrk="1" latinLnBrk="0" hangingPunct="1">
+      <a:defRPr sz="880" kern="1200">
         <a:solidFill>
           <a:schemeClr val="tx1"/>
         </a:solidFill>
@@ -46,8 +46,8 @@
         <a:cs typeface="+mn-cs"/>
       </a:defRPr>
     </a:lvl3pPr>
-    <a:lvl4pPr marL="689890" algn="l" defTabSz="229962" rtl="0" eaLnBrk="1" latinLnBrk="0" hangingPunct="1">
-      <a:defRPr sz="951" kern="1200">
+    <a:lvl4pPr marL="638700" algn="l" defTabSz="212899" rtl="0" eaLnBrk="1" latinLnBrk="0" hangingPunct="1">
+      <a:defRPr sz="880" kern="1200">
         <a:solidFill>
           <a:schemeClr val="tx1"/>
         </a:solidFill>
@@ -56,8 +56,8 @@
         <a:cs typeface="+mn-cs"/>
       </a:defRPr>
     </a:lvl4pPr>
-    <a:lvl5pPr marL="919852" algn="l" defTabSz="229962" rtl="0" eaLnBrk="1" latinLnBrk="0" hangingPunct="1">
-      <a:defRPr sz="951" kern="1200">
+    <a:lvl5pPr marL="851599" algn="l" defTabSz="212899" rtl="0" eaLnBrk="1" latinLnBrk="0" hangingPunct="1">
+      <a:defRPr sz="880" kern="1200">
         <a:solidFill>
           <a:schemeClr val="tx1"/>
         </a:solidFill>
@@ -66,8 +66,8 @@
         <a:cs typeface="+mn-cs"/>
       </a:defRPr>
     </a:lvl5pPr>
-    <a:lvl6pPr marL="1149818" algn="l" defTabSz="229962" rtl="0" eaLnBrk="1" latinLnBrk="0" hangingPunct="1">
-      <a:defRPr sz="951" kern="1200">
+    <a:lvl6pPr marL="1064502" algn="l" defTabSz="212899" rtl="0" eaLnBrk="1" latinLnBrk="0" hangingPunct="1">
+      <a:defRPr sz="880" kern="1200">
         <a:solidFill>
           <a:schemeClr val="tx1"/>
         </a:solidFill>
@@ -76,8 +76,8 @@
         <a:cs typeface="+mn-cs"/>
       </a:defRPr>
     </a:lvl6pPr>
-    <a:lvl7pPr marL="1379780" algn="l" defTabSz="229962" rtl="0" eaLnBrk="1" latinLnBrk="0" hangingPunct="1">
-      <a:defRPr sz="951" kern="1200">
+    <a:lvl7pPr marL="1277400" algn="l" defTabSz="212899" rtl="0" eaLnBrk="1" latinLnBrk="0" hangingPunct="1">
+      <a:defRPr sz="880" kern="1200">
         <a:solidFill>
           <a:schemeClr val="tx1"/>
         </a:solidFill>
@@ -86,8 +86,8 @@
         <a:cs typeface="+mn-cs"/>
       </a:defRPr>
     </a:lvl7pPr>
-    <a:lvl8pPr marL="1609746" algn="l" defTabSz="229962" rtl="0" eaLnBrk="1" latinLnBrk="0" hangingPunct="1">
-      <a:defRPr sz="951" kern="1200">
+    <a:lvl8pPr marL="1490303" algn="l" defTabSz="212899" rtl="0" eaLnBrk="1" latinLnBrk="0" hangingPunct="1">
+      <a:defRPr sz="880" kern="1200">
         <a:solidFill>
           <a:schemeClr val="tx1"/>
         </a:solidFill>
@@ -96,8 +96,8 @@
         <a:cs typeface="+mn-cs"/>
       </a:defRPr>
     </a:lvl8pPr>
-    <a:lvl9pPr marL="1839709" algn="l" defTabSz="229962" rtl="0" eaLnBrk="1" latinLnBrk="0" hangingPunct="1">
-      <a:defRPr sz="951" kern="1200">
+    <a:lvl9pPr marL="1703203" algn="l" defTabSz="212899" rtl="0" eaLnBrk="1" latinLnBrk="0" hangingPunct="1">
+      <a:defRPr sz="880" kern="1200">
         <a:solidFill>
           <a:schemeClr val="tx1"/>
         </a:solidFill>
@@ -110,12 +110,12 @@
   <p:extLst>
     <p:ext uri="{EFAFB233-063F-42B5-8137-9DF3F51BA10A}">
       <p15:sldGuideLst xmlns:p15="http://schemas.microsoft.com/office/powerpoint/2012/main">
-        <p15:guide id="1" orient="horz" pos="864" userDrawn="1">
+        <p15:guide id="1" orient="horz" pos="1814" userDrawn="1">
           <p15:clr>
             <a:srgbClr val="A4A3A4"/>
           </p15:clr>
         </p15:guide>
-        <p15:guide id="2" pos="3168" userDrawn="1">
+        <p15:guide id="2" pos="1021" userDrawn="1">
           <p15:clr>
             <a:srgbClr val="A4A3A4"/>
           </p15:clr>
@@ -208,7 +208,7 @@
           <a:p>
             <a:fld id="{C571D33F-B151-5442-9D79-DA0A881D815F}" type="datetimeFigureOut">
               <a:rPr lang="en-US" smtClean="0"/>
-              <a:t>8/22/22</a:t>
+              <a:t>9/11/23</a:t>
             </a:fld>
             <a:endParaRPr lang="en-US"/>
           </a:p>
@@ -226,8 +226,8 @@
         </p:nvSpPr>
         <p:spPr>
           <a:xfrm>
-            <a:off x="-2228850" y="1143000"/>
-            <a:ext cx="11315700" cy="3086100"/>
+            <a:off x="2560638" y="1143000"/>
+            <a:ext cx="1736725" cy="3086100"/>
           </a:xfrm>
           <a:prstGeom prst="rect">
             <a:avLst/>
@@ -381,8 +381,8 @@
   </p:cSld>
   <p:clrMap bg1="lt1" tx1="dk1" bg2="lt2" tx2="dk2" accent1="accent1" accent2="accent2" accent3="accent3" accent4="accent4" accent5="accent5" accent6="accent6" hlink="hlink" folHlink="folHlink"/>
   <p:notesStyle>
-    <a:lvl1pPr marL="0" algn="l" defTabSz="621116" rtl="0" eaLnBrk="1" latinLnBrk="0" hangingPunct="1">
-      <a:defRPr sz="815" kern="1200">
+    <a:lvl1pPr marL="0" algn="l" defTabSz="575029" rtl="0" eaLnBrk="1" latinLnBrk="0" hangingPunct="1">
+      <a:defRPr sz="755" kern="1200">
         <a:solidFill>
           <a:schemeClr val="tx1"/>
         </a:solidFill>
@@ -391,8 +391,8 @@
         <a:cs typeface="+mn-cs"/>
       </a:defRPr>
     </a:lvl1pPr>
-    <a:lvl2pPr marL="310557" algn="l" defTabSz="621116" rtl="0" eaLnBrk="1" latinLnBrk="0" hangingPunct="1">
-      <a:defRPr sz="815" kern="1200">
+    <a:lvl2pPr marL="287514" algn="l" defTabSz="575029" rtl="0" eaLnBrk="1" latinLnBrk="0" hangingPunct="1">
+      <a:defRPr sz="755" kern="1200">
         <a:solidFill>
           <a:schemeClr val="tx1"/>
         </a:solidFill>
@@ -401,8 +401,8 @@
         <a:cs typeface="+mn-cs"/>
       </a:defRPr>
     </a:lvl2pPr>
-    <a:lvl3pPr marL="621116" algn="l" defTabSz="621116" rtl="0" eaLnBrk="1" latinLnBrk="0" hangingPunct="1">
-      <a:defRPr sz="815" kern="1200">
+    <a:lvl3pPr marL="575029" algn="l" defTabSz="575029" rtl="0" eaLnBrk="1" latinLnBrk="0" hangingPunct="1">
+      <a:defRPr sz="755" kern="1200">
         <a:solidFill>
           <a:schemeClr val="tx1"/>
         </a:solidFill>
@@ -411,8 +411,8 @@
         <a:cs typeface="+mn-cs"/>
       </a:defRPr>
     </a:lvl3pPr>
-    <a:lvl4pPr marL="931674" algn="l" defTabSz="621116" rtl="0" eaLnBrk="1" latinLnBrk="0" hangingPunct="1">
-      <a:defRPr sz="815" kern="1200">
+    <a:lvl4pPr marL="862544" algn="l" defTabSz="575029" rtl="0" eaLnBrk="1" latinLnBrk="0" hangingPunct="1">
+      <a:defRPr sz="755" kern="1200">
         <a:solidFill>
           <a:schemeClr val="tx1"/>
         </a:solidFill>
@@ -421,8 +421,8 @@
         <a:cs typeface="+mn-cs"/>
       </a:defRPr>
     </a:lvl4pPr>
-    <a:lvl5pPr marL="1242233" algn="l" defTabSz="621116" rtl="0" eaLnBrk="1" latinLnBrk="0" hangingPunct="1">
-      <a:defRPr sz="815" kern="1200">
+    <a:lvl5pPr marL="1150059" algn="l" defTabSz="575029" rtl="0" eaLnBrk="1" latinLnBrk="0" hangingPunct="1">
+      <a:defRPr sz="755" kern="1200">
         <a:solidFill>
           <a:schemeClr val="tx1"/>
         </a:solidFill>
@@ -431,8 +431,8 @@
         <a:cs typeface="+mn-cs"/>
       </a:defRPr>
     </a:lvl5pPr>
-    <a:lvl6pPr marL="1552791" algn="l" defTabSz="621116" rtl="0" eaLnBrk="1" latinLnBrk="0" hangingPunct="1">
-      <a:defRPr sz="815" kern="1200">
+    <a:lvl6pPr marL="1437574" algn="l" defTabSz="575029" rtl="0" eaLnBrk="1" latinLnBrk="0" hangingPunct="1">
+      <a:defRPr sz="755" kern="1200">
         <a:solidFill>
           <a:schemeClr val="tx1"/>
         </a:solidFill>
@@ -441,8 +441,8 @@
         <a:cs typeface="+mn-cs"/>
       </a:defRPr>
     </a:lvl6pPr>
-    <a:lvl7pPr marL="1863349" algn="l" defTabSz="621116" rtl="0" eaLnBrk="1" latinLnBrk="0" hangingPunct="1">
-      <a:defRPr sz="815" kern="1200">
+    <a:lvl7pPr marL="1725089" algn="l" defTabSz="575029" rtl="0" eaLnBrk="1" latinLnBrk="0" hangingPunct="1">
+      <a:defRPr sz="755" kern="1200">
         <a:solidFill>
           <a:schemeClr val="tx1"/>
         </a:solidFill>
@@ -451,8 +451,8 @@
         <a:cs typeface="+mn-cs"/>
       </a:defRPr>
     </a:lvl7pPr>
-    <a:lvl8pPr marL="2173908" algn="l" defTabSz="621116" rtl="0" eaLnBrk="1" latinLnBrk="0" hangingPunct="1">
-      <a:defRPr sz="815" kern="1200">
+    <a:lvl8pPr marL="2012604" algn="l" defTabSz="575029" rtl="0" eaLnBrk="1" latinLnBrk="0" hangingPunct="1">
+      <a:defRPr sz="755" kern="1200">
         <a:solidFill>
           <a:schemeClr val="tx1"/>
         </a:solidFill>
@@ -461,8 +461,8 @@
         <a:cs typeface="+mn-cs"/>
       </a:defRPr>
     </a:lvl8pPr>
-    <a:lvl9pPr marL="2484466" algn="l" defTabSz="621116" rtl="0" eaLnBrk="1" latinLnBrk="0" hangingPunct="1">
-      <a:defRPr sz="815" kern="1200">
+    <a:lvl9pPr marL="2300119" algn="l" defTabSz="575029" rtl="0" eaLnBrk="1" latinLnBrk="0" hangingPunct="1">
+      <a:defRPr sz="755" kern="1200">
         <a:solidFill>
           <a:schemeClr val="tx1"/>
         </a:solidFill>
@@ -504,8 +504,8 @@
         </p:nvSpPr>
         <p:spPr>
           <a:xfrm>
-            <a:off x="-2228850" y="1143000"/>
-            <a:ext cx="11315700" cy="3086100"/>
+            <a:off x="2560638" y="1143000"/>
+            <a:ext cx="1736725" cy="3086100"/>
           </a:xfrm>
         </p:spPr>
       </p:sp>
@@ -593,8 +593,8 @@
         </p:nvSpPr>
         <p:spPr>
           <a:xfrm>
-            <a:off x="754393" y="852177"/>
-            <a:ext cx="8549639" cy="588009"/>
+            <a:off x="243011" y="1789180"/>
+            <a:ext cx="2754074" cy="1234548"/>
           </a:xfrm>
         </p:spPr>
         <p:txBody>
@@ -620,8 +620,8 @@
         </p:nvSpPr>
         <p:spPr>
           <a:xfrm>
-            <a:off x="1508773" y="1554487"/>
-            <a:ext cx="7040882" cy="701039"/>
+            <a:off x="486017" y="3263706"/>
+            <a:ext cx="2268062" cy="1471857"/>
           </a:xfrm>
         </p:spPr>
         <p:txBody>
@@ -637,7 +637,7 @@
                 </a:solidFill>
               </a:defRPr>
             </a:lvl1pPr>
-            <a:lvl2pPr marL="1044394" indent="0" algn="ctr">
+            <a:lvl2pPr marL="1918970" indent="0" algn="ctr">
               <a:buNone/>
               <a:defRPr>
                 <a:solidFill>
@@ -647,7 +647,7 @@
                 </a:solidFill>
               </a:defRPr>
             </a:lvl2pPr>
-            <a:lvl3pPr marL="2088799" indent="0" algn="ctr">
+            <a:lvl3pPr marL="3837959" indent="0" algn="ctr">
               <a:buNone/>
               <a:defRPr>
                 <a:solidFill>
@@ -657,7 +657,7 @@
                 </a:solidFill>
               </a:defRPr>
             </a:lvl3pPr>
-            <a:lvl4pPr marL="3133193" indent="0" algn="ctr">
+            <a:lvl4pPr marL="5756929" indent="0" algn="ctr">
               <a:buNone/>
               <a:defRPr>
                 <a:solidFill>
@@ -667,7 +667,7 @@
                 </a:solidFill>
               </a:defRPr>
             </a:lvl4pPr>
-            <a:lvl5pPr marL="4177585" indent="0" algn="ctr">
+            <a:lvl5pPr marL="7675895" indent="0" algn="ctr">
               <a:buNone/>
               <a:defRPr>
                 <a:solidFill>
@@ -677,7 +677,7 @@
                 </a:solidFill>
               </a:defRPr>
             </a:lvl5pPr>
-            <a:lvl6pPr marL="5221993" indent="0" algn="ctr">
+            <a:lvl6pPr marL="9594890" indent="0" algn="ctr">
               <a:buNone/>
               <a:defRPr>
                 <a:solidFill>
@@ -687,7 +687,7 @@
                 </a:solidFill>
               </a:defRPr>
             </a:lvl6pPr>
-            <a:lvl7pPr marL="6266385" indent="0" algn="ctr">
+            <a:lvl7pPr marL="11513856" indent="0" algn="ctr">
               <a:buNone/>
               <a:defRPr>
                 <a:solidFill>
@@ -697,7 +697,7 @@
                 </a:solidFill>
               </a:defRPr>
             </a:lvl7pPr>
-            <a:lvl8pPr marL="7310790" indent="0" algn="ctr">
+            <a:lvl8pPr marL="13432846" indent="0" algn="ctr">
               <a:buNone/>
               <a:defRPr>
                 <a:solidFill>
@@ -707,7 +707,7 @@
                 </a:solidFill>
               </a:defRPr>
             </a:lvl8pPr>
-            <a:lvl9pPr marL="8355191" indent="0" algn="ctr">
+            <a:lvl9pPr marL="15351828" indent="0" algn="ctr">
               <a:buNone/>
               <a:defRPr>
                 <a:solidFill>
@@ -743,7 +743,7 @@
           <a:p>
             <a:fld id="{01197F44-DB72-474A-9754-31703E05C006}" type="datetimeFigureOut">
               <a:rPr lang="en-US" smtClean="0"/>
-              <a:t>8/22/22</a:t>
+              <a:t>9/11/23</a:t>
             </a:fld>
             <a:endParaRPr lang="en-US"/>
           </a:p>
@@ -911,7 +911,7 @@
           <a:p>
             <a:fld id="{01197F44-DB72-474A-9754-31703E05C006}" type="datetimeFigureOut">
               <a:rPr lang="en-US" smtClean="0"/>
-              <a:t>8/22/22</a:t>
+              <a:t>9/11/23</a:t>
             </a:fld>
             <a:endParaRPr lang="en-US"/>
           </a:p>
@@ -1001,8 +1001,8 @@
         </p:nvSpPr>
         <p:spPr>
           <a:xfrm>
-            <a:off x="7292343" y="109857"/>
-            <a:ext cx="2263140" cy="2340612"/>
+            <a:off x="2349067" y="230650"/>
+            <a:ext cx="729020" cy="4914201"/>
           </a:xfrm>
         </p:spPr>
         <p:txBody>
@@ -1028,8 +1028,8 @@
         </p:nvSpPr>
         <p:spPr>
           <a:xfrm>
-            <a:off x="502926" y="109857"/>
-            <a:ext cx="6621780" cy="2340612"/>
+            <a:off x="162007" y="230650"/>
+            <a:ext cx="2133058" cy="4914201"/>
           </a:xfrm>
         </p:spPr>
         <p:txBody>
@@ -1089,7 +1089,7 @@
           <a:p>
             <a:fld id="{01197F44-DB72-474A-9754-31703E05C006}" type="datetimeFigureOut">
               <a:rPr lang="en-US" smtClean="0"/>
-              <a:t>8/22/22</a:t>
+              <a:t>9/11/23</a:t>
             </a:fld>
             <a:endParaRPr lang="en-US"/>
           </a:p>
@@ -1257,7 +1257,7 @@
           <a:p>
             <a:fld id="{01197F44-DB72-474A-9754-31703E05C006}" type="datetimeFigureOut">
               <a:rPr lang="en-US" smtClean="0"/>
-              <a:t>8/22/22</a:t>
+              <a:t>9/11/23</a:t>
             </a:fld>
             <a:endParaRPr lang="en-US"/>
           </a:p>
@@ -1347,15 +1347,15 @@
         </p:nvSpPr>
         <p:spPr>
           <a:xfrm>
-            <a:off x="794559" y="1762768"/>
-            <a:ext cx="8549639" cy="544831"/>
+            <a:off x="255950" y="3701000"/>
+            <a:ext cx="2754074" cy="1143893"/>
           </a:xfrm>
         </p:spPr>
         <p:txBody>
           <a:bodyPr anchor="t"/>
           <a:lstStyle>
             <a:lvl1pPr algn="l">
-              <a:defRPr sz="9254" b="1" cap="all"/>
+              <a:defRPr sz="17003" b="1" cap="all"/>
             </a:lvl1pPr>
           </a:lstStyle>
           <a:p>
@@ -1378,8 +1378,8 @@
         </p:nvSpPr>
         <p:spPr>
           <a:xfrm>
-            <a:off x="794559" y="1162692"/>
-            <a:ext cx="8549639" cy="600075"/>
+            <a:off x="255950" y="2441118"/>
+            <a:ext cx="2754074" cy="1259880"/>
           </a:xfrm>
         </p:spPr>
         <p:txBody>
@@ -1387,7 +1387,7 @@
           <a:lstStyle>
             <a:lvl1pPr marL="0" indent="0">
               <a:buNone/>
-              <a:defRPr sz="4936">
+              <a:defRPr sz="9069">
                 <a:solidFill>
                   <a:schemeClr val="tx1">
                     <a:tint val="75000"/>
@@ -1395,9 +1395,9 @@
                 </a:solidFill>
               </a:defRPr>
             </a:lvl1pPr>
-            <a:lvl2pPr marL="1044394" indent="0">
-              <a:buNone/>
-              <a:defRPr sz="4318">
+            <a:lvl2pPr marL="1918970" indent="0">
+              <a:buNone/>
+              <a:defRPr sz="7934">
                 <a:solidFill>
                   <a:schemeClr val="tx1">
                     <a:tint val="75000"/>
@@ -1405,9 +1405,9 @@
                 </a:solidFill>
               </a:defRPr>
             </a:lvl2pPr>
-            <a:lvl3pPr marL="2088799" indent="0">
-              <a:buNone/>
-              <a:defRPr sz="3702">
+            <a:lvl3pPr marL="3837959" indent="0">
+              <a:buNone/>
+              <a:defRPr sz="6802">
                 <a:solidFill>
                   <a:schemeClr val="tx1">
                     <a:tint val="75000"/>
@@ -1415,9 +1415,9 @@
                 </a:solidFill>
               </a:defRPr>
             </a:lvl3pPr>
-            <a:lvl4pPr marL="3133193" indent="0">
-              <a:buNone/>
-              <a:defRPr sz="3084">
+            <a:lvl4pPr marL="5756929" indent="0">
+              <a:buNone/>
+              <a:defRPr sz="5667">
                 <a:solidFill>
                   <a:schemeClr val="tx1">
                     <a:tint val="75000"/>
@@ -1425,9 +1425,9 @@
                 </a:solidFill>
               </a:defRPr>
             </a:lvl4pPr>
-            <a:lvl5pPr marL="4177585" indent="0">
-              <a:buNone/>
-              <a:defRPr sz="3084">
+            <a:lvl5pPr marL="7675895" indent="0">
+              <a:buNone/>
+              <a:defRPr sz="5667">
                 <a:solidFill>
                   <a:schemeClr val="tx1">
                     <a:tint val="75000"/>
@@ -1435,9 +1435,9 @@
                 </a:solidFill>
               </a:defRPr>
             </a:lvl5pPr>
-            <a:lvl6pPr marL="5221993" indent="0">
-              <a:buNone/>
-              <a:defRPr sz="3084">
+            <a:lvl6pPr marL="9594890" indent="0">
+              <a:buNone/>
+              <a:defRPr sz="5667">
                 <a:solidFill>
                   <a:schemeClr val="tx1">
                     <a:tint val="75000"/>
@@ -1445,9 +1445,9 @@
                 </a:solidFill>
               </a:defRPr>
             </a:lvl6pPr>
-            <a:lvl7pPr marL="6266385" indent="0">
-              <a:buNone/>
-              <a:defRPr sz="3084">
+            <a:lvl7pPr marL="11513856" indent="0">
+              <a:buNone/>
+              <a:defRPr sz="5667">
                 <a:solidFill>
                   <a:schemeClr val="tx1">
                     <a:tint val="75000"/>
@@ -1455,9 +1455,9 @@
                 </a:solidFill>
               </a:defRPr>
             </a:lvl7pPr>
-            <a:lvl8pPr marL="7310790" indent="0">
-              <a:buNone/>
-              <a:defRPr sz="3084">
+            <a:lvl8pPr marL="13432846" indent="0">
+              <a:buNone/>
+              <a:defRPr sz="5667">
                 <a:solidFill>
                   <a:schemeClr val="tx1">
                     <a:tint val="75000"/>
@@ -1465,9 +1465,9 @@
                 </a:solidFill>
               </a:defRPr>
             </a:lvl8pPr>
-            <a:lvl9pPr marL="8355191" indent="0">
-              <a:buNone/>
-              <a:defRPr sz="3084">
+            <a:lvl9pPr marL="15351828" indent="0">
+              <a:buNone/>
+              <a:defRPr sz="5667">
                 <a:solidFill>
                   <a:schemeClr val="tx1">
                     <a:tint val="75000"/>
@@ -1502,7 +1502,7 @@
           <a:p>
             <a:fld id="{01197F44-DB72-474A-9754-31703E05C006}" type="datetimeFigureOut">
               <a:rPr lang="en-US" smtClean="0"/>
-              <a:t>8/22/22</a:t>
+              <a:t>9/11/23</a:t>
             </a:fld>
             <a:endParaRPr lang="en-US"/>
           </a:p>
@@ -1614,39 +1614,39 @@
         </p:nvSpPr>
         <p:spPr>
           <a:xfrm>
-            <a:off x="502928" y="640089"/>
-            <a:ext cx="4442462" cy="1810385"/>
+            <a:off x="162007" y="1343894"/>
+            <a:ext cx="1431039" cy="3800970"/>
           </a:xfrm>
         </p:spPr>
         <p:txBody>
           <a:bodyPr/>
           <a:lstStyle>
             <a:lvl1pPr>
-              <a:defRPr sz="6787"/>
+              <a:defRPr sz="12470"/>
             </a:lvl1pPr>
             <a:lvl2pPr>
-              <a:defRPr sz="5553"/>
+              <a:defRPr sz="10203"/>
             </a:lvl2pPr>
             <a:lvl3pPr>
-              <a:defRPr sz="4936"/>
+              <a:defRPr sz="9069"/>
             </a:lvl3pPr>
             <a:lvl4pPr>
-              <a:defRPr sz="4318"/>
+              <a:defRPr sz="7934"/>
             </a:lvl4pPr>
             <a:lvl5pPr>
-              <a:defRPr sz="4318"/>
+              <a:defRPr sz="7934"/>
             </a:lvl5pPr>
             <a:lvl6pPr>
-              <a:defRPr sz="4318"/>
+              <a:defRPr sz="7934"/>
             </a:lvl6pPr>
             <a:lvl7pPr>
-              <a:defRPr sz="4318"/>
+              <a:defRPr sz="7934"/>
             </a:lvl7pPr>
             <a:lvl8pPr>
-              <a:defRPr sz="4318"/>
+              <a:defRPr sz="7934"/>
             </a:lvl8pPr>
             <a:lvl9pPr>
-              <a:defRPr sz="4318"/>
+              <a:defRPr sz="7934"/>
             </a:lvl9pPr>
           </a:lstStyle>
           <a:p>
@@ -1698,39 +1698,39 @@
         </p:nvSpPr>
         <p:spPr>
           <a:xfrm>
-            <a:off x="5113033" y="640089"/>
-            <a:ext cx="4442462" cy="1810385"/>
+            <a:off x="1647051" y="1343894"/>
+            <a:ext cx="1431039" cy="3800970"/>
           </a:xfrm>
         </p:spPr>
         <p:txBody>
           <a:bodyPr/>
           <a:lstStyle>
             <a:lvl1pPr>
-              <a:defRPr sz="6787"/>
+              <a:defRPr sz="12470"/>
             </a:lvl1pPr>
             <a:lvl2pPr>
-              <a:defRPr sz="5553"/>
+              <a:defRPr sz="10203"/>
             </a:lvl2pPr>
             <a:lvl3pPr>
-              <a:defRPr sz="4936"/>
+              <a:defRPr sz="9069"/>
             </a:lvl3pPr>
             <a:lvl4pPr>
-              <a:defRPr sz="4318"/>
+              <a:defRPr sz="7934"/>
             </a:lvl4pPr>
             <a:lvl5pPr>
-              <a:defRPr sz="4318"/>
+              <a:defRPr sz="7934"/>
             </a:lvl5pPr>
             <a:lvl6pPr>
-              <a:defRPr sz="4318"/>
+              <a:defRPr sz="7934"/>
             </a:lvl6pPr>
             <a:lvl7pPr>
-              <a:defRPr sz="4318"/>
+              <a:defRPr sz="7934"/>
             </a:lvl7pPr>
             <a:lvl8pPr>
-              <a:defRPr sz="4318"/>
+              <a:defRPr sz="7934"/>
             </a:lvl8pPr>
             <a:lvl9pPr>
-              <a:defRPr sz="4318"/>
+              <a:defRPr sz="7934"/>
             </a:lvl9pPr>
           </a:lstStyle>
           <a:p>
@@ -1787,7 +1787,7 @@
           <a:p>
             <a:fld id="{01197F44-DB72-474A-9754-31703E05C006}" type="datetimeFigureOut">
               <a:rPr lang="en-US" smtClean="0"/>
-              <a:t>8/22/22</a:t>
+              <a:t>9/11/23</a:t>
             </a:fld>
             <a:endParaRPr lang="en-US"/>
           </a:p>
@@ -1903,8 +1903,8 @@
         </p:nvSpPr>
         <p:spPr>
           <a:xfrm>
-            <a:off x="502932" y="614052"/>
-            <a:ext cx="4444209" cy="255903"/>
+            <a:off x="162009" y="1289228"/>
+            <a:ext cx="1431602" cy="537278"/>
           </a:xfrm>
         </p:spPr>
         <p:txBody>
@@ -1912,39 +1912,39 @@
           <a:lstStyle>
             <a:lvl1pPr marL="0" indent="0">
               <a:buNone/>
-              <a:defRPr sz="5553" b="1"/>
+              <a:defRPr sz="10203" b="1"/>
             </a:lvl1pPr>
-            <a:lvl2pPr marL="1044394" indent="0">
-              <a:buNone/>
-              <a:defRPr sz="4936" b="1"/>
+            <a:lvl2pPr marL="1918970" indent="0">
+              <a:buNone/>
+              <a:defRPr sz="9069" b="1"/>
             </a:lvl2pPr>
-            <a:lvl3pPr marL="2088799" indent="0">
-              <a:buNone/>
-              <a:defRPr sz="4318" b="1"/>
+            <a:lvl3pPr marL="3837959" indent="0">
+              <a:buNone/>
+              <a:defRPr sz="7934" b="1"/>
             </a:lvl3pPr>
-            <a:lvl4pPr marL="3133193" indent="0">
-              <a:buNone/>
-              <a:defRPr sz="3702" b="1"/>
+            <a:lvl4pPr marL="5756929" indent="0">
+              <a:buNone/>
+              <a:defRPr sz="6802" b="1"/>
             </a:lvl4pPr>
-            <a:lvl5pPr marL="4177585" indent="0">
-              <a:buNone/>
-              <a:defRPr sz="3702" b="1"/>
+            <a:lvl5pPr marL="7675895" indent="0">
+              <a:buNone/>
+              <a:defRPr sz="6802" b="1"/>
             </a:lvl5pPr>
-            <a:lvl6pPr marL="5221993" indent="0">
-              <a:buNone/>
-              <a:defRPr sz="3702" b="1"/>
+            <a:lvl6pPr marL="9594890" indent="0">
+              <a:buNone/>
+              <a:defRPr sz="6802" b="1"/>
             </a:lvl6pPr>
-            <a:lvl7pPr marL="6266385" indent="0">
-              <a:buNone/>
-              <a:defRPr sz="3702" b="1"/>
+            <a:lvl7pPr marL="11513856" indent="0">
+              <a:buNone/>
+              <a:defRPr sz="6802" b="1"/>
             </a:lvl7pPr>
-            <a:lvl8pPr marL="7310790" indent="0">
-              <a:buNone/>
-              <a:defRPr sz="3702" b="1"/>
+            <a:lvl8pPr marL="13432846" indent="0">
+              <a:buNone/>
+              <a:defRPr sz="6802" b="1"/>
             </a:lvl8pPr>
-            <a:lvl9pPr marL="8355191" indent="0">
-              <a:buNone/>
-              <a:defRPr sz="3702" b="1"/>
+            <a:lvl9pPr marL="15351828" indent="0">
+              <a:buNone/>
+              <a:defRPr sz="6802" b="1"/>
             </a:lvl9pPr>
           </a:lstStyle>
           <a:p>
@@ -1968,39 +1968,39 @@
         </p:nvSpPr>
         <p:spPr>
           <a:xfrm>
-            <a:off x="502932" y="869952"/>
-            <a:ext cx="4444209" cy="1580517"/>
+            <a:off x="162009" y="1826500"/>
+            <a:ext cx="1431602" cy="3318354"/>
           </a:xfrm>
         </p:spPr>
         <p:txBody>
           <a:bodyPr/>
           <a:lstStyle>
             <a:lvl1pPr>
-              <a:defRPr sz="5553"/>
+              <a:defRPr sz="10203"/>
             </a:lvl1pPr>
             <a:lvl2pPr>
-              <a:defRPr sz="4936"/>
+              <a:defRPr sz="9069"/>
             </a:lvl2pPr>
             <a:lvl3pPr>
-              <a:defRPr sz="4318"/>
+              <a:defRPr sz="7934"/>
             </a:lvl3pPr>
             <a:lvl4pPr>
-              <a:defRPr sz="3702"/>
+              <a:defRPr sz="6802"/>
             </a:lvl4pPr>
             <a:lvl5pPr>
-              <a:defRPr sz="3702"/>
+              <a:defRPr sz="6802"/>
             </a:lvl5pPr>
             <a:lvl6pPr>
-              <a:defRPr sz="3702"/>
+              <a:defRPr sz="6802"/>
             </a:lvl6pPr>
             <a:lvl7pPr>
-              <a:defRPr sz="3702"/>
+              <a:defRPr sz="6802"/>
             </a:lvl7pPr>
             <a:lvl8pPr>
-              <a:defRPr sz="3702"/>
+              <a:defRPr sz="6802"/>
             </a:lvl8pPr>
             <a:lvl9pPr>
-              <a:defRPr sz="3702"/>
+              <a:defRPr sz="6802"/>
             </a:lvl9pPr>
           </a:lstStyle>
           <a:p>
@@ -2052,8 +2052,8 @@
         </p:nvSpPr>
         <p:spPr>
           <a:xfrm>
-            <a:off x="5109538" y="614052"/>
-            <a:ext cx="4445954" cy="255903"/>
+            <a:off x="1645925" y="1289228"/>
+            <a:ext cx="1432164" cy="537278"/>
           </a:xfrm>
         </p:spPr>
         <p:txBody>
@@ -2061,39 +2061,39 @@
           <a:lstStyle>
             <a:lvl1pPr marL="0" indent="0">
               <a:buNone/>
-              <a:defRPr sz="5553" b="1"/>
+              <a:defRPr sz="10203" b="1"/>
             </a:lvl1pPr>
-            <a:lvl2pPr marL="1044394" indent="0">
-              <a:buNone/>
-              <a:defRPr sz="4936" b="1"/>
+            <a:lvl2pPr marL="1918970" indent="0">
+              <a:buNone/>
+              <a:defRPr sz="9069" b="1"/>
             </a:lvl2pPr>
-            <a:lvl3pPr marL="2088799" indent="0">
-              <a:buNone/>
-              <a:defRPr sz="4318" b="1"/>
+            <a:lvl3pPr marL="3837959" indent="0">
+              <a:buNone/>
+              <a:defRPr sz="7934" b="1"/>
             </a:lvl3pPr>
-            <a:lvl4pPr marL="3133193" indent="0">
-              <a:buNone/>
-              <a:defRPr sz="3702" b="1"/>
+            <a:lvl4pPr marL="5756929" indent="0">
+              <a:buNone/>
+              <a:defRPr sz="6802" b="1"/>
             </a:lvl4pPr>
-            <a:lvl5pPr marL="4177585" indent="0">
-              <a:buNone/>
-              <a:defRPr sz="3702" b="1"/>
+            <a:lvl5pPr marL="7675895" indent="0">
+              <a:buNone/>
+              <a:defRPr sz="6802" b="1"/>
             </a:lvl5pPr>
-            <a:lvl6pPr marL="5221993" indent="0">
-              <a:buNone/>
-              <a:defRPr sz="3702" b="1"/>
+            <a:lvl6pPr marL="9594890" indent="0">
+              <a:buNone/>
+              <a:defRPr sz="6802" b="1"/>
             </a:lvl6pPr>
-            <a:lvl7pPr marL="6266385" indent="0">
-              <a:buNone/>
-              <a:defRPr sz="3702" b="1"/>
+            <a:lvl7pPr marL="11513856" indent="0">
+              <a:buNone/>
+              <a:defRPr sz="6802" b="1"/>
             </a:lvl7pPr>
-            <a:lvl8pPr marL="7310790" indent="0">
-              <a:buNone/>
-              <a:defRPr sz="3702" b="1"/>
+            <a:lvl8pPr marL="13432846" indent="0">
+              <a:buNone/>
+              <a:defRPr sz="6802" b="1"/>
             </a:lvl8pPr>
-            <a:lvl9pPr marL="8355191" indent="0">
-              <a:buNone/>
-              <a:defRPr sz="3702" b="1"/>
+            <a:lvl9pPr marL="15351828" indent="0">
+              <a:buNone/>
+              <a:defRPr sz="6802" b="1"/>
             </a:lvl9pPr>
           </a:lstStyle>
           <a:p>
@@ -2117,39 +2117,39 @@
         </p:nvSpPr>
         <p:spPr>
           <a:xfrm>
-            <a:off x="5109538" y="869952"/>
-            <a:ext cx="4445954" cy="1580517"/>
+            <a:off x="1645925" y="1826500"/>
+            <a:ext cx="1432164" cy="3318354"/>
           </a:xfrm>
         </p:spPr>
         <p:txBody>
           <a:bodyPr/>
           <a:lstStyle>
             <a:lvl1pPr>
-              <a:defRPr sz="5553"/>
+              <a:defRPr sz="10203"/>
             </a:lvl1pPr>
             <a:lvl2pPr>
-              <a:defRPr sz="4936"/>
+              <a:defRPr sz="9069"/>
             </a:lvl2pPr>
             <a:lvl3pPr>
-              <a:defRPr sz="4318"/>
+              <a:defRPr sz="7934"/>
             </a:lvl3pPr>
             <a:lvl4pPr>
-              <a:defRPr sz="3702"/>
+              <a:defRPr sz="6802"/>
             </a:lvl4pPr>
             <a:lvl5pPr>
-              <a:defRPr sz="3702"/>
+              <a:defRPr sz="6802"/>
             </a:lvl5pPr>
             <a:lvl6pPr>
-              <a:defRPr sz="3702"/>
+              <a:defRPr sz="6802"/>
             </a:lvl6pPr>
             <a:lvl7pPr>
-              <a:defRPr sz="3702"/>
+              <a:defRPr sz="6802"/>
             </a:lvl7pPr>
             <a:lvl8pPr>
-              <a:defRPr sz="3702"/>
+              <a:defRPr sz="6802"/>
             </a:lvl8pPr>
             <a:lvl9pPr>
-              <a:defRPr sz="3702"/>
+              <a:defRPr sz="6802"/>
             </a:lvl9pPr>
           </a:lstStyle>
           <a:p>
@@ -2206,7 +2206,7 @@
           <a:p>
             <a:fld id="{01197F44-DB72-474A-9754-31703E05C006}" type="datetimeFigureOut">
               <a:rPr lang="en-US" smtClean="0"/>
-              <a:t>8/22/22</a:t>
+              <a:t>9/11/23</a:t>
             </a:fld>
             <a:endParaRPr lang="en-US"/>
           </a:p>
@@ -2323,7 +2323,7 @@
           <a:p>
             <a:fld id="{01197F44-DB72-474A-9754-31703E05C006}" type="datetimeFigureOut">
               <a:rPr lang="en-US" smtClean="0"/>
-              <a:t>8/22/22</a:t>
+              <a:t>9/11/23</a:t>
             </a:fld>
             <a:endParaRPr lang="en-US"/>
           </a:p>
@@ -2418,7 +2418,7 @@
           <a:p>
             <a:fld id="{01197F44-DB72-474A-9754-31703E05C006}" type="datetimeFigureOut">
               <a:rPr lang="en-US" smtClean="0"/>
-              <a:t>8/22/22</a:t>
+              <a:t>9/11/23</a:t>
             </a:fld>
             <a:endParaRPr lang="en-US"/>
           </a:p>
@@ -2508,15 +2508,15 @@
         </p:nvSpPr>
         <p:spPr>
           <a:xfrm>
-            <a:off x="502930" y="109225"/>
-            <a:ext cx="3309144" cy="464821"/>
+            <a:off x="162009" y="229326"/>
+            <a:ext cx="1065966" cy="975909"/>
           </a:xfrm>
         </p:spPr>
         <p:txBody>
           <a:bodyPr anchor="b"/>
           <a:lstStyle>
             <a:lvl1pPr algn="l">
-              <a:defRPr sz="4936" b="1"/>
+              <a:defRPr sz="9069" b="1"/>
             </a:lvl1pPr>
           </a:lstStyle>
           <a:p>
@@ -2539,39 +2539,39 @@
         </p:nvSpPr>
         <p:spPr>
           <a:xfrm>
-            <a:off x="3932569" y="109226"/>
-            <a:ext cx="5622925" cy="2341245"/>
+            <a:off x="1266789" y="229328"/>
+            <a:ext cx="1811300" cy="4915530"/>
           </a:xfrm>
         </p:spPr>
         <p:txBody>
           <a:bodyPr/>
           <a:lstStyle>
             <a:lvl1pPr>
-              <a:defRPr sz="8022"/>
+              <a:defRPr sz="14740"/>
             </a:lvl1pPr>
             <a:lvl2pPr>
-              <a:defRPr sz="6787"/>
+              <a:defRPr sz="12470"/>
             </a:lvl2pPr>
             <a:lvl3pPr>
-              <a:defRPr sz="5553"/>
+              <a:defRPr sz="10203"/>
             </a:lvl3pPr>
             <a:lvl4pPr>
-              <a:defRPr sz="4936"/>
+              <a:defRPr sz="9069"/>
             </a:lvl4pPr>
             <a:lvl5pPr>
-              <a:defRPr sz="4936"/>
+              <a:defRPr sz="9069"/>
             </a:lvl5pPr>
             <a:lvl6pPr>
-              <a:defRPr sz="4936"/>
+              <a:defRPr sz="9069"/>
             </a:lvl6pPr>
             <a:lvl7pPr>
-              <a:defRPr sz="4936"/>
+              <a:defRPr sz="9069"/>
             </a:lvl7pPr>
             <a:lvl8pPr>
-              <a:defRPr sz="4936"/>
+              <a:defRPr sz="9069"/>
             </a:lvl8pPr>
             <a:lvl9pPr>
-              <a:defRPr sz="4936"/>
+              <a:defRPr sz="9069"/>
             </a:lvl9pPr>
           </a:lstStyle>
           <a:p>
@@ -2623,8 +2623,8 @@
         </p:nvSpPr>
         <p:spPr>
           <a:xfrm>
-            <a:off x="502930" y="574046"/>
-            <a:ext cx="3309144" cy="1876425"/>
+            <a:off x="162009" y="1205234"/>
+            <a:ext cx="1065966" cy="3939624"/>
           </a:xfrm>
         </p:spPr>
         <p:txBody>
@@ -2632,39 +2632,39 @@
           <a:lstStyle>
             <a:lvl1pPr marL="0" indent="0">
               <a:buNone/>
-              <a:defRPr sz="3084"/>
+              <a:defRPr sz="5667"/>
             </a:lvl1pPr>
-            <a:lvl2pPr marL="1044394" indent="0">
-              <a:buNone/>
-              <a:defRPr sz="2468"/>
+            <a:lvl2pPr marL="1918970" indent="0">
+              <a:buNone/>
+              <a:defRPr sz="4535"/>
             </a:lvl2pPr>
-            <a:lvl3pPr marL="2088799" indent="0">
-              <a:buNone/>
-              <a:defRPr sz="1851"/>
+            <a:lvl3pPr marL="3837959" indent="0">
+              <a:buNone/>
+              <a:defRPr sz="3401"/>
             </a:lvl3pPr>
-            <a:lvl4pPr marL="3133193" indent="0">
-              <a:buNone/>
-              <a:defRPr sz="1851"/>
+            <a:lvl4pPr marL="5756929" indent="0">
+              <a:buNone/>
+              <a:defRPr sz="3401"/>
             </a:lvl4pPr>
-            <a:lvl5pPr marL="4177585" indent="0">
-              <a:buNone/>
-              <a:defRPr sz="1851"/>
+            <a:lvl5pPr marL="7675895" indent="0">
+              <a:buNone/>
+              <a:defRPr sz="3401"/>
             </a:lvl5pPr>
-            <a:lvl6pPr marL="5221993" indent="0">
-              <a:buNone/>
-              <a:defRPr sz="1851"/>
+            <a:lvl6pPr marL="9594890" indent="0">
+              <a:buNone/>
+              <a:defRPr sz="3401"/>
             </a:lvl6pPr>
-            <a:lvl7pPr marL="6266385" indent="0">
-              <a:buNone/>
-              <a:defRPr sz="1851"/>
+            <a:lvl7pPr marL="11513856" indent="0">
+              <a:buNone/>
+              <a:defRPr sz="3401"/>
             </a:lvl7pPr>
-            <a:lvl8pPr marL="7310790" indent="0">
-              <a:buNone/>
-              <a:defRPr sz="1851"/>
+            <a:lvl8pPr marL="13432846" indent="0">
+              <a:buNone/>
+              <a:defRPr sz="3401"/>
             </a:lvl8pPr>
-            <a:lvl9pPr marL="8355191" indent="0">
-              <a:buNone/>
-              <a:defRPr sz="1851"/>
+            <a:lvl9pPr marL="15351828" indent="0">
+              <a:buNone/>
+              <a:defRPr sz="3401"/>
             </a:lvl9pPr>
           </a:lstStyle>
           <a:p>
@@ -2693,7 +2693,7 @@
           <a:p>
             <a:fld id="{01197F44-DB72-474A-9754-31703E05C006}" type="datetimeFigureOut">
               <a:rPr lang="en-US" smtClean="0"/>
-              <a:t>8/22/22</a:t>
+              <a:t>9/11/23</a:t>
             </a:fld>
             <a:endParaRPr lang="en-US"/>
           </a:p>
@@ -2783,15 +2783,15 @@
         </p:nvSpPr>
         <p:spPr>
           <a:xfrm>
-            <a:off x="1971522" y="1920247"/>
-            <a:ext cx="6035040" cy="226695"/>
+            <a:off x="635081" y="4031633"/>
+            <a:ext cx="1944053" cy="475955"/>
           </a:xfrm>
         </p:spPr>
         <p:txBody>
           <a:bodyPr anchor="b"/>
           <a:lstStyle>
             <a:lvl1pPr algn="l">
-              <a:defRPr sz="4936" b="1"/>
+              <a:defRPr sz="9069" b="1"/>
             </a:lvl1pPr>
           </a:lstStyle>
           <a:p>
@@ -2814,8 +2814,8 @@
         </p:nvSpPr>
         <p:spPr>
           <a:xfrm>
-            <a:off x="1971522" y="245110"/>
-            <a:ext cx="6035040" cy="1645920"/>
+            <a:off x="635081" y="514617"/>
+            <a:ext cx="1944053" cy="3455670"/>
           </a:xfrm>
         </p:spPr>
         <p:txBody>
@@ -2823,39 +2823,39 @@
           <a:lstStyle>
             <a:lvl1pPr marL="0" indent="0">
               <a:buNone/>
-              <a:defRPr sz="8022"/>
+              <a:defRPr sz="14740"/>
             </a:lvl1pPr>
-            <a:lvl2pPr marL="1044394" indent="0">
-              <a:buNone/>
-              <a:defRPr sz="6787"/>
+            <a:lvl2pPr marL="1918970" indent="0">
+              <a:buNone/>
+              <a:defRPr sz="12470"/>
             </a:lvl2pPr>
-            <a:lvl3pPr marL="2088799" indent="0">
-              <a:buNone/>
-              <a:defRPr sz="5553"/>
+            <a:lvl3pPr marL="3837959" indent="0">
+              <a:buNone/>
+              <a:defRPr sz="10203"/>
             </a:lvl3pPr>
-            <a:lvl4pPr marL="3133193" indent="0">
-              <a:buNone/>
-              <a:defRPr sz="4936"/>
+            <a:lvl4pPr marL="5756929" indent="0">
+              <a:buNone/>
+              <a:defRPr sz="9069"/>
             </a:lvl4pPr>
-            <a:lvl5pPr marL="4177585" indent="0">
-              <a:buNone/>
-              <a:defRPr sz="4936"/>
+            <a:lvl5pPr marL="7675895" indent="0">
+              <a:buNone/>
+              <a:defRPr sz="9069"/>
             </a:lvl5pPr>
-            <a:lvl6pPr marL="5221993" indent="0">
-              <a:buNone/>
-              <a:defRPr sz="4936"/>
+            <a:lvl6pPr marL="9594890" indent="0">
+              <a:buNone/>
+              <a:defRPr sz="9069"/>
             </a:lvl6pPr>
-            <a:lvl7pPr marL="6266385" indent="0">
-              <a:buNone/>
-              <a:defRPr sz="4936"/>
+            <a:lvl7pPr marL="11513856" indent="0">
+              <a:buNone/>
+              <a:defRPr sz="9069"/>
             </a:lvl7pPr>
-            <a:lvl8pPr marL="7310790" indent="0">
-              <a:buNone/>
-              <a:defRPr sz="4936"/>
+            <a:lvl8pPr marL="13432846" indent="0">
+              <a:buNone/>
+              <a:defRPr sz="9069"/>
             </a:lvl8pPr>
-            <a:lvl9pPr marL="8355191" indent="0">
-              <a:buNone/>
-              <a:defRPr sz="4936"/>
+            <a:lvl9pPr marL="15351828" indent="0">
+              <a:buNone/>
+              <a:defRPr sz="9069"/>
             </a:lvl9pPr>
           </a:lstStyle>
           <a:p>
@@ -2875,8 +2875,8 @@
         </p:nvSpPr>
         <p:spPr>
           <a:xfrm>
-            <a:off x="1971522" y="2146940"/>
-            <a:ext cx="6035040" cy="321945"/>
+            <a:off x="635081" y="4507584"/>
+            <a:ext cx="1944053" cy="675935"/>
           </a:xfrm>
         </p:spPr>
         <p:txBody>
@@ -2884,39 +2884,39 @@
           <a:lstStyle>
             <a:lvl1pPr marL="0" indent="0">
               <a:buNone/>
-              <a:defRPr sz="3084"/>
+              <a:defRPr sz="5667"/>
             </a:lvl1pPr>
-            <a:lvl2pPr marL="1044394" indent="0">
-              <a:buNone/>
-              <a:defRPr sz="2468"/>
+            <a:lvl2pPr marL="1918970" indent="0">
+              <a:buNone/>
+              <a:defRPr sz="4535"/>
             </a:lvl2pPr>
-            <a:lvl3pPr marL="2088799" indent="0">
-              <a:buNone/>
-              <a:defRPr sz="1851"/>
+            <a:lvl3pPr marL="3837959" indent="0">
+              <a:buNone/>
+              <a:defRPr sz="3401"/>
             </a:lvl3pPr>
-            <a:lvl4pPr marL="3133193" indent="0">
-              <a:buNone/>
-              <a:defRPr sz="1851"/>
+            <a:lvl4pPr marL="5756929" indent="0">
+              <a:buNone/>
+              <a:defRPr sz="3401"/>
             </a:lvl4pPr>
-            <a:lvl5pPr marL="4177585" indent="0">
-              <a:buNone/>
-              <a:defRPr sz="1851"/>
+            <a:lvl5pPr marL="7675895" indent="0">
+              <a:buNone/>
+              <a:defRPr sz="3401"/>
             </a:lvl5pPr>
-            <a:lvl6pPr marL="5221993" indent="0">
-              <a:buNone/>
-              <a:defRPr sz="1851"/>
+            <a:lvl6pPr marL="9594890" indent="0">
+              <a:buNone/>
+              <a:defRPr sz="3401"/>
             </a:lvl6pPr>
-            <a:lvl7pPr marL="6266385" indent="0">
-              <a:buNone/>
-              <a:defRPr sz="1851"/>
+            <a:lvl7pPr marL="11513856" indent="0">
+              <a:buNone/>
+              <a:defRPr sz="3401"/>
             </a:lvl7pPr>
-            <a:lvl8pPr marL="7310790" indent="0">
-              <a:buNone/>
-              <a:defRPr sz="1851"/>
+            <a:lvl8pPr marL="13432846" indent="0">
+              <a:buNone/>
+              <a:defRPr sz="3401"/>
             </a:lvl8pPr>
-            <a:lvl9pPr marL="8355191" indent="0">
-              <a:buNone/>
-              <a:defRPr sz="1851"/>
+            <a:lvl9pPr marL="15351828" indent="0">
+              <a:buNone/>
+              <a:defRPr sz="3401"/>
             </a:lvl9pPr>
           </a:lstStyle>
           <a:p>
@@ -2945,7 +2945,7 @@
           <a:p>
             <a:fld id="{01197F44-DB72-474A-9754-31703E05C006}" type="datetimeFigureOut">
               <a:rPr lang="en-US" smtClean="0"/>
-              <a:t>8/22/22</a:t>
+              <a:t>9/11/23</a:t>
             </a:fld>
             <a:endParaRPr lang="en-US"/>
           </a:p>
@@ -3040,8 +3040,8 @@
         </p:nvSpPr>
         <p:spPr>
           <a:xfrm>
-            <a:off x="502933" y="109858"/>
-            <a:ext cx="9052562" cy="457200"/>
+            <a:off x="162008" y="230651"/>
+            <a:ext cx="2916080" cy="959908"/>
           </a:xfrm>
           <a:prstGeom prst="rect">
             <a:avLst/>
@@ -3072,8 +3072,8 @@
         </p:nvSpPr>
         <p:spPr>
           <a:xfrm>
-            <a:off x="502933" y="640089"/>
-            <a:ext cx="9052562" cy="1810385"/>
+            <a:off x="162008" y="1343894"/>
+            <a:ext cx="2916080" cy="3800970"/>
           </a:xfrm>
           <a:prstGeom prst="rect">
             <a:avLst/>
@@ -3133,8 +3133,8 @@
         </p:nvSpPr>
         <p:spPr>
           <a:xfrm>
-            <a:off x="502920" y="2542545"/>
-            <a:ext cx="2346960" cy="146049"/>
+            <a:off x="162006" y="5338171"/>
+            <a:ext cx="756021" cy="306635"/>
           </a:xfrm>
           <a:prstGeom prst="rect">
             <a:avLst/>
@@ -3144,7 +3144,7 @@
           <a:bodyPr vert="horz" lIns="67711" tIns="33854" rIns="67711" bIns="33854" rtlCol="0" anchor="ctr"/>
           <a:lstStyle>
             <a:lvl1pPr algn="l">
-              <a:defRPr sz="2468">
+              <a:defRPr sz="4535">
                 <a:solidFill>
                   <a:schemeClr val="tx1">
                     <a:tint val="75000"/>
@@ -3156,7 +3156,7 @@
           <a:p>
             <a:fld id="{01197F44-DB72-474A-9754-31703E05C006}" type="datetimeFigureOut">
               <a:rPr lang="en-US" smtClean="0"/>
-              <a:t>8/22/22</a:t>
+              <a:t>9/11/23</a:t>
             </a:fld>
             <a:endParaRPr lang="en-US"/>
           </a:p>
@@ -3174,8 +3174,8 @@
         </p:nvSpPr>
         <p:spPr>
           <a:xfrm>
-            <a:off x="3436623" y="2542545"/>
-            <a:ext cx="3185163" cy="146049"/>
+            <a:off x="1107031" y="5338171"/>
+            <a:ext cx="1026029" cy="306635"/>
           </a:xfrm>
           <a:prstGeom prst="rect">
             <a:avLst/>
@@ -3185,7 +3185,7 @@
           <a:bodyPr vert="horz" lIns="67711" tIns="33854" rIns="67711" bIns="33854" rtlCol="0" anchor="ctr"/>
           <a:lstStyle>
             <a:lvl1pPr algn="ctr">
-              <a:defRPr sz="2468">
+              <a:defRPr sz="4535">
                 <a:solidFill>
                   <a:schemeClr val="tx1">
                     <a:tint val="75000"/>
@@ -3211,8 +3211,8 @@
         </p:nvSpPr>
         <p:spPr>
           <a:xfrm>
-            <a:off x="7208520" y="2542545"/>
-            <a:ext cx="2346960" cy="146049"/>
+            <a:off x="2322065" y="5338171"/>
+            <a:ext cx="756021" cy="306635"/>
           </a:xfrm>
           <a:prstGeom prst="rect">
             <a:avLst/>
@@ -3222,7 +3222,7 @@
           <a:bodyPr vert="horz" lIns="67711" tIns="33854" rIns="67711" bIns="33854" rtlCol="0" anchor="ctr"/>
           <a:lstStyle>
             <a:lvl1pPr algn="r">
-              <a:defRPr sz="2468">
+              <a:defRPr sz="4535">
                 <a:solidFill>
                   <a:schemeClr val="tx1">
                     <a:tint val="75000"/>
@@ -3263,12 +3263,12 @@
   </p:sldLayoutIdLst>
   <p:txStyles>
     <p:titleStyle>
-      <a:lvl1pPr algn="ctr" defTabSz="1044394" rtl="0" eaLnBrk="1" latinLnBrk="0" hangingPunct="1">
+      <a:lvl1pPr algn="ctr" defTabSz="1918970" rtl="0" eaLnBrk="1" latinLnBrk="0" hangingPunct="1">
         <a:spcBef>
           <a:spcPct val="0"/>
         </a:spcBef>
         <a:buNone/>
-        <a:defRPr sz="9872" kern="1200">
+        <a:defRPr sz="18139" kern="1200">
           <a:solidFill>
             <a:schemeClr val="tx1"/>
           </a:solidFill>
@@ -3279,13 +3279,13 @@
       </a:lvl1pPr>
     </p:titleStyle>
     <p:bodyStyle>
-      <a:lvl1pPr marL="783295" indent="-783295" algn="l" defTabSz="1044394" rtl="0" eaLnBrk="1" latinLnBrk="0" hangingPunct="1">
+      <a:lvl1pPr marL="1439226" indent="-1439226" algn="l" defTabSz="1918970" rtl="0" eaLnBrk="1" latinLnBrk="0" hangingPunct="1">
         <a:spcBef>
           <a:spcPct val="20000"/>
         </a:spcBef>
         <a:buFont typeface="Arial"/>
         <a:buChar char="•"/>
-        <a:defRPr sz="8022" kern="1200">
+        <a:defRPr sz="14740" kern="1200">
           <a:solidFill>
             <a:schemeClr val="tx1"/>
           </a:solidFill>
@@ -3294,13 +3294,13 @@
           <a:cs typeface="+mn-cs"/>
         </a:defRPr>
       </a:lvl1pPr>
-      <a:lvl2pPr marL="1697150" indent="-652744" algn="l" defTabSz="1044394" rtl="0" eaLnBrk="1" latinLnBrk="0" hangingPunct="1">
+      <a:lvl2pPr marL="3118343" indent="-1199352" algn="l" defTabSz="1918970" rtl="0" eaLnBrk="1" latinLnBrk="0" hangingPunct="1">
         <a:spcBef>
           <a:spcPct val="20000"/>
         </a:spcBef>
         <a:buFont typeface="Arial"/>
         <a:buChar char="–"/>
-        <a:defRPr sz="6787" kern="1200">
+        <a:defRPr sz="12470" kern="1200">
           <a:solidFill>
             <a:schemeClr val="tx1"/>
           </a:solidFill>
@@ -3309,13 +3309,13 @@
           <a:cs typeface="+mn-cs"/>
         </a:defRPr>
       </a:lvl2pPr>
-      <a:lvl3pPr marL="2610995" indent="-522190" algn="l" defTabSz="1044394" rtl="0" eaLnBrk="1" latinLnBrk="0" hangingPunct="1">
+      <a:lvl3pPr marL="4797442" indent="-959472" algn="l" defTabSz="1918970" rtl="0" eaLnBrk="1" latinLnBrk="0" hangingPunct="1">
         <a:spcBef>
           <a:spcPct val="20000"/>
         </a:spcBef>
         <a:buFont typeface="Arial"/>
         <a:buChar char="•"/>
-        <a:defRPr sz="5553" kern="1200">
+        <a:defRPr sz="10203" kern="1200">
           <a:solidFill>
             <a:schemeClr val="tx1"/>
           </a:solidFill>
@@ -3324,13 +3324,13 @@
           <a:cs typeface="+mn-cs"/>
         </a:defRPr>
       </a:lvl3pPr>
-      <a:lvl4pPr marL="3655389" indent="-522190" algn="l" defTabSz="1044394" rtl="0" eaLnBrk="1" latinLnBrk="0" hangingPunct="1">
+      <a:lvl4pPr marL="6716412" indent="-959472" algn="l" defTabSz="1918970" rtl="0" eaLnBrk="1" latinLnBrk="0" hangingPunct="1">
         <a:spcBef>
           <a:spcPct val="20000"/>
         </a:spcBef>
         <a:buFont typeface="Arial"/>
         <a:buChar char="–"/>
-        <a:defRPr sz="4936" kern="1200">
+        <a:defRPr sz="9069" kern="1200">
           <a:solidFill>
             <a:schemeClr val="tx1"/>
           </a:solidFill>
@@ -3339,13 +3339,13 @@
           <a:cs typeface="+mn-cs"/>
         </a:defRPr>
       </a:lvl4pPr>
-      <a:lvl5pPr marL="4699797" indent="-522190" algn="l" defTabSz="1044394" rtl="0" eaLnBrk="1" latinLnBrk="0" hangingPunct="1">
+      <a:lvl5pPr marL="8635407" indent="-959472" algn="l" defTabSz="1918970" rtl="0" eaLnBrk="1" latinLnBrk="0" hangingPunct="1">
         <a:spcBef>
           <a:spcPct val="20000"/>
         </a:spcBef>
         <a:buFont typeface="Arial"/>
         <a:buChar char="»"/>
-        <a:defRPr sz="4936" kern="1200">
+        <a:defRPr sz="9069" kern="1200">
           <a:solidFill>
             <a:schemeClr val="tx1"/>
           </a:solidFill>
@@ -3354,13 +3354,13 @@
           <a:cs typeface="+mn-cs"/>
         </a:defRPr>
       </a:lvl5pPr>
-      <a:lvl6pPr marL="5744195" indent="-522190" algn="l" defTabSz="1044394" rtl="0" eaLnBrk="1" latinLnBrk="0" hangingPunct="1">
+      <a:lvl6pPr marL="10554384" indent="-959472" algn="l" defTabSz="1918970" rtl="0" eaLnBrk="1" latinLnBrk="0" hangingPunct="1">
         <a:spcBef>
           <a:spcPct val="20000"/>
         </a:spcBef>
         <a:buFont typeface="Arial"/>
         <a:buChar char="•"/>
-        <a:defRPr sz="4936" kern="1200">
+        <a:defRPr sz="9069" kern="1200">
           <a:solidFill>
             <a:schemeClr val="tx1"/>
           </a:solidFill>
@@ -3369,13 +3369,13 @@
           <a:cs typeface="+mn-cs"/>
         </a:defRPr>
       </a:lvl6pPr>
-      <a:lvl7pPr marL="6788594" indent="-522190" algn="l" defTabSz="1044394" rtl="0" eaLnBrk="1" latinLnBrk="0" hangingPunct="1">
+      <a:lvl7pPr marL="12473363" indent="-959472" algn="l" defTabSz="1918970" rtl="0" eaLnBrk="1" latinLnBrk="0" hangingPunct="1">
         <a:spcBef>
           <a:spcPct val="20000"/>
         </a:spcBef>
         <a:buFont typeface="Arial"/>
         <a:buChar char="•"/>
-        <a:defRPr sz="4936" kern="1200">
+        <a:defRPr sz="9069" kern="1200">
           <a:solidFill>
             <a:schemeClr val="tx1"/>
           </a:solidFill>
@@ -3384,13 +3384,13 @@
           <a:cs typeface="+mn-cs"/>
         </a:defRPr>
       </a:lvl7pPr>
-      <a:lvl8pPr marL="7832988" indent="-522190" algn="l" defTabSz="1044394" rtl="0" eaLnBrk="1" latinLnBrk="0" hangingPunct="1">
+      <a:lvl8pPr marL="14392332" indent="-959472" algn="l" defTabSz="1918970" rtl="0" eaLnBrk="1" latinLnBrk="0" hangingPunct="1">
         <a:spcBef>
           <a:spcPct val="20000"/>
         </a:spcBef>
         <a:buFont typeface="Arial"/>
         <a:buChar char="•"/>
-        <a:defRPr sz="4936" kern="1200">
+        <a:defRPr sz="9069" kern="1200">
           <a:solidFill>
             <a:schemeClr val="tx1"/>
           </a:solidFill>
@@ -3399,13 +3399,13 @@
           <a:cs typeface="+mn-cs"/>
         </a:defRPr>
       </a:lvl8pPr>
-      <a:lvl9pPr marL="8877390" indent="-522190" algn="l" defTabSz="1044394" rtl="0" eaLnBrk="1" latinLnBrk="0" hangingPunct="1">
+      <a:lvl9pPr marL="16311316" indent="-959472" algn="l" defTabSz="1918970" rtl="0" eaLnBrk="1" latinLnBrk="0" hangingPunct="1">
         <a:spcBef>
           <a:spcPct val="20000"/>
         </a:spcBef>
         <a:buFont typeface="Arial"/>
         <a:buChar char="•"/>
-        <a:defRPr sz="4936" kern="1200">
+        <a:defRPr sz="9069" kern="1200">
           <a:solidFill>
             <a:schemeClr val="tx1"/>
           </a:solidFill>
@@ -3419,8 +3419,8 @@
       <a:defPPr>
         <a:defRPr lang="en-US"/>
       </a:defPPr>
-      <a:lvl1pPr marL="0" algn="l" defTabSz="1044394" rtl="0" eaLnBrk="1" latinLnBrk="0" hangingPunct="1">
-        <a:defRPr sz="4318" kern="1200">
+      <a:lvl1pPr marL="0" algn="l" defTabSz="1918970" rtl="0" eaLnBrk="1" latinLnBrk="0" hangingPunct="1">
+        <a:defRPr sz="7934" kern="1200">
           <a:solidFill>
             <a:schemeClr val="tx1"/>
           </a:solidFill>
@@ -3429,8 +3429,8 @@
           <a:cs typeface="+mn-cs"/>
         </a:defRPr>
       </a:lvl1pPr>
-      <a:lvl2pPr marL="1044394" algn="l" defTabSz="1044394" rtl="0" eaLnBrk="1" latinLnBrk="0" hangingPunct="1">
-        <a:defRPr sz="4318" kern="1200">
+      <a:lvl2pPr marL="1918970" algn="l" defTabSz="1918970" rtl="0" eaLnBrk="1" latinLnBrk="0" hangingPunct="1">
+        <a:defRPr sz="7934" kern="1200">
           <a:solidFill>
             <a:schemeClr val="tx1"/>
           </a:solidFill>
@@ -3439,8 +3439,8 @@
           <a:cs typeface="+mn-cs"/>
         </a:defRPr>
       </a:lvl2pPr>
-      <a:lvl3pPr marL="2088799" algn="l" defTabSz="1044394" rtl="0" eaLnBrk="1" latinLnBrk="0" hangingPunct="1">
-        <a:defRPr sz="4318" kern="1200">
+      <a:lvl3pPr marL="3837959" algn="l" defTabSz="1918970" rtl="0" eaLnBrk="1" latinLnBrk="0" hangingPunct="1">
+        <a:defRPr sz="7934" kern="1200">
           <a:solidFill>
             <a:schemeClr val="tx1"/>
           </a:solidFill>
@@ -3449,8 +3449,8 @@
           <a:cs typeface="+mn-cs"/>
         </a:defRPr>
       </a:lvl3pPr>
-      <a:lvl4pPr marL="3133193" algn="l" defTabSz="1044394" rtl="0" eaLnBrk="1" latinLnBrk="0" hangingPunct="1">
-        <a:defRPr sz="4318" kern="1200">
+      <a:lvl4pPr marL="5756929" algn="l" defTabSz="1918970" rtl="0" eaLnBrk="1" latinLnBrk="0" hangingPunct="1">
+        <a:defRPr sz="7934" kern="1200">
           <a:solidFill>
             <a:schemeClr val="tx1"/>
           </a:solidFill>
@@ -3459,8 +3459,8 @@
           <a:cs typeface="+mn-cs"/>
         </a:defRPr>
       </a:lvl4pPr>
-      <a:lvl5pPr marL="4177585" algn="l" defTabSz="1044394" rtl="0" eaLnBrk="1" latinLnBrk="0" hangingPunct="1">
-        <a:defRPr sz="4318" kern="1200">
+      <a:lvl5pPr marL="7675895" algn="l" defTabSz="1918970" rtl="0" eaLnBrk="1" latinLnBrk="0" hangingPunct="1">
+        <a:defRPr sz="7934" kern="1200">
           <a:solidFill>
             <a:schemeClr val="tx1"/>
           </a:solidFill>
@@ -3469,8 +3469,8 @@
           <a:cs typeface="+mn-cs"/>
         </a:defRPr>
       </a:lvl5pPr>
-      <a:lvl6pPr marL="5221993" algn="l" defTabSz="1044394" rtl="0" eaLnBrk="1" latinLnBrk="0" hangingPunct="1">
-        <a:defRPr sz="4318" kern="1200">
+      <a:lvl6pPr marL="9594890" algn="l" defTabSz="1918970" rtl="0" eaLnBrk="1" latinLnBrk="0" hangingPunct="1">
+        <a:defRPr sz="7934" kern="1200">
           <a:solidFill>
             <a:schemeClr val="tx1"/>
           </a:solidFill>
@@ -3479,8 +3479,8 @@
           <a:cs typeface="+mn-cs"/>
         </a:defRPr>
       </a:lvl6pPr>
-      <a:lvl7pPr marL="6266385" algn="l" defTabSz="1044394" rtl="0" eaLnBrk="1" latinLnBrk="0" hangingPunct="1">
-        <a:defRPr sz="4318" kern="1200">
+      <a:lvl7pPr marL="11513856" algn="l" defTabSz="1918970" rtl="0" eaLnBrk="1" latinLnBrk="0" hangingPunct="1">
+        <a:defRPr sz="7934" kern="1200">
           <a:solidFill>
             <a:schemeClr val="tx1"/>
           </a:solidFill>
@@ -3489,8 +3489,8 @@
           <a:cs typeface="+mn-cs"/>
         </a:defRPr>
       </a:lvl7pPr>
-      <a:lvl8pPr marL="7310790" algn="l" defTabSz="1044394" rtl="0" eaLnBrk="1" latinLnBrk="0" hangingPunct="1">
-        <a:defRPr sz="4318" kern="1200">
+      <a:lvl8pPr marL="13432846" algn="l" defTabSz="1918970" rtl="0" eaLnBrk="1" latinLnBrk="0" hangingPunct="1">
+        <a:defRPr sz="7934" kern="1200">
           <a:solidFill>
             <a:schemeClr val="tx1"/>
           </a:solidFill>
@@ -3499,8 +3499,8 @@
           <a:cs typeface="+mn-cs"/>
         </a:defRPr>
       </a:lvl8pPr>
-      <a:lvl9pPr marL="8355191" algn="l" defTabSz="1044394" rtl="0" eaLnBrk="1" latinLnBrk="0" hangingPunct="1">
-        <a:defRPr sz="4318" kern="1200">
+      <a:lvl9pPr marL="15351828" algn="l" defTabSz="1918970" rtl="0" eaLnBrk="1" latinLnBrk="0" hangingPunct="1">
+        <a:defRPr sz="7934" kern="1200">
           <a:solidFill>
             <a:schemeClr val="tx1"/>
           </a:solidFill>
@@ -3531,12 +3531,82 @@
           <a:chExt cx="0" cy="0"/>
         </a:xfrm>
       </p:grpSpPr>
+      <p:sp>
+        <p:nvSpPr>
+          <p:cNvPr id="18" name="TextBox 17">
+            <a:extLst>
+              <a:ext uri="{FF2B5EF4-FFF2-40B4-BE49-F238E27FC236}">
+                <a16:creationId xmlns:a16="http://schemas.microsoft.com/office/drawing/2014/main" id="{65FBEAF1-371D-7842-B595-FDB1FCB8F6CB}"/>
+              </a:ext>
+            </a:extLst>
+          </p:cNvPr>
+          <p:cNvSpPr txBox="1"/>
+          <p:nvPr/>
+        </p:nvSpPr>
+        <p:spPr>
+          <a:xfrm>
+            <a:off x="-65958" y="0"/>
+            <a:ext cx="805912" cy="523220"/>
+          </a:xfrm>
+          <a:prstGeom prst="rect">
+            <a:avLst/>
+          </a:prstGeom>
+          <a:noFill/>
+        </p:spPr>
+        <p:txBody>
+          <a:bodyPr wrap="square" rtlCol="0">
+            <a:spAutoFit/>
+          </a:bodyPr>
+          <a:lstStyle/>
+          <a:p>
+            <a:r>
+              <a:rPr lang="en-US" sz="2800" b="1" dirty="0"/>
+              <a:t>A</a:t>
+            </a:r>
+          </a:p>
+        </p:txBody>
+      </p:sp>
+      <p:sp>
+        <p:nvSpPr>
+          <p:cNvPr id="19" name="TextBox 18">
+            <a:extLst>
+              <a:ext uri="{FF2B5EF4-FFF2-40B4-BE49-F238E27FC236}">
+                <a16:creationId xmlns:a16="http://schemas.microsoft.com/office/drawing/2014/main" id="{915A84E7-8CC5-E44F-95D9-34E232BB5693}"/>
+              </a:ext>
+            </a:extLst>
+          </p:cNvPr>
+          <p:cNvSpPr txBox="1"/>
+          <p:nvPr/>
+        </p:nvSpPr>
+        <p:spPr>
+          <a:xfrm>
+            <a:off x="-73362" y="2917168"/>
+            <a:ext cx="805912" cy="523220"/>
+          </a:xfrm>
+          <a:prstGeom prst="rect">
+            <a:avLst/>
+          </a:prstGeom>
+          <a:noFill/>
+        </p:spPr>
+        <p:txBody>
+          <a:bodyPr wrap="square" rtlCol="0">
+            <a:spAutoFit/>
+          </a:bodyPr>
+          <a:lstStyle/>
+          <a:p>
+            <a:r>
+              <a:rPr lang="en-US" sz="2800" b="1" dirty="0"/>
+              <a:t>B</a:t>
+            </a:r>
+          </a:p>
+        </p:txBody>
+      </p:sp>
       <p:pic>
         <p:nvPicPr>
-          <p:cNvPr id="29" name="Picture 28">
+          <p:cNvPr id="20" name="Picture 19">
             <a:extLst>
               <a:ext uri="{FF2B5EF4-FFF2-40B4-BE49-F238E27FC236}">
-                <a16:creationId xmlns:a16="http://schemas.microsoft.com/office/drawing/2014/main" id="{EE3B93BF-5C3F-BB4A-AA2E-597E1A8117C9}"/>
+                <a16:creationId xmlns:a16="http://schemas.microsoft.com/office/drawing/2014/main" id="{BDDCCB5B-ED47-984A-9D0B-7840AEC3DE1A}"/>
               </a:ext>
             </a:extLst>
           </p:cNvPr>
@@ -3553,8 +3623,8 @@
         </p:blipFill>
         <p:spPr>
           <a:xfrm>
-            <a:off x="408229" y="81632"/>
-            <a:ext cx="4529438" cy="2622306"/>
+            <a:off x="237145" y="118883"/>
+            <a:ext cx="2985247" cy="2743200"/>
           </a:xfrm>
           <a:prstGeom prst="rect">
             <a:avLst/>
@@ -3563,10 +3633,10 @@
       </p:pic>
       <p:pic>
         <p:nvPicPr>
-          <p:cNvPr id="30" name="Picture 29">
+          <p:cNvPr id="21" name="Picture 20">
             <a:extLst>
               <a:ext uri="{FF2B5EF4-FFF2-40B4-BE49-F238E27FC236}">
-                <a16:creationId xmlns:a16="http://schemas.microsoft.com/office/drawing/2014/main" id="{498A4DC8-F79A-6C49-9C26-1E31DDB448B0}"/>
+                <a16:creationId xmlns:a16="http://schemas.microsoft.com/office/drawing/2014/main" id="{0A5A3F4D-E17E-974F-BC77-79B8BCFEEE8E}"/>
               </a:ext>
             </a:extLst>
           </p:cNvPr>
@@ -3583,114 +3653,14 @@
         </p:blipFill>
         <p:spPr>
           <a:xfrm>
-            <a:off x="185980" y="532360"/>
-            <a:ext cx="222250" cy="1720850"/>
+            <a:off x="270960" y="2996108"/>
+            <a:ext cx="2932597" cy="2743200"/>
           </a:xfrm>
           <a:prstGeom prst="rect">
             <a:avLst/>
           </a:prstGeom>
         </p:spPr>
       </p:pic>
-      <p:pic>
-        <p:nvPicPr>
-          <p:cNvPr id="31" name="Picture 30">
-            <a:extLst>
-              <a:ext uri="{FF2B5EF4-FFF2-40B4-BE49-F238E27FC236}">
-                <a16:creationId xmlns:a16="http://schemas.microsoft.com/office/drawing/2014/main" id="{9DE3F03B-071D-224D-AB4A-0D39CA3837DD}"/>
-              </a:ext>
-            </a:extLst>
-          </p:cNvPr>
-          <p:cNvPicPr>
-            <a:picLocks noChangeAspect="1"/>
-          </p:cNvPicPr>
-          <p:nvPr/>
-        </p:nvPicPr>
-        <p:blipFill>
-          <a:blip r:embed="rId5"/>
-          <a:stretch>
-            <a:fillRect/>
-          </a:stretch>
-        </p:blipFill>
-        <p:spPr>
-          <a:xfrm>
-            <a:off x="5120734" y="82803"/>
-            <a:ext cx="4709368" cy="2621135"/>
-          </a:xfrm>
-          <a:prstGeom prst="rect">
-            <a:avLst/>
-          </a:prstGeom>
-        </p:spPr>
-      </p:pic>
-      <p:sp>
-        <p:nvSpPr>
-          <p:cNvPr id="32" name="TextBox 31">
-            <a:extLst>
-              <a:ext uri="{FF2B5EF4-FFF2-40B4-BE49-F238E27FC236}">
-                <a16:creationId xmlns:a16="http://schemas.microsoft.com/office/drawing/2014/main" id="{4C0F95E1-6045-3F4E-8F52-03378CF9D05A}"/>
-              </a:ext>
-            </a:extLst>
-          </p:cNvPr>
-          <p:cNvSpPr txBox="1"/>
-          <p:nvPr/>
-        </p:nvSpPr>
-        <p:spPr>
-          <a:xfrm>
-            <a:off x="133221" y="-118883"/>
-            <a:ext cx="805912" cy="523220"/>
-          </a:xfrm>
-          <a:prstGeom prst="rect">
-            <a:avLst/>
-          </a:prstGeom>
-          <a:noFill/>
-        </p:spPr>
-        <p:txBody>
-          <a:bodyPr wrap="square" rtlCol="0">
-            <a:spAutoFit/>
-          </a:bodyPr>
-          <a:lstStyle/>
-          <a:p>
-            <a:r>
-              <a:rPr lang="en-US" sz="2800" b="1" dirty="0"/>
-              <a:t>A</a:t>
-            </a:r>
-          </a:p>
-        </p:txBody>
-      </p:sp>
-      <p:sp>
-        <p:nvSpPr>
-          <p:cNvPr id="33" name="TextBox 32">
-            <a:extLst>
-              <a:ext uri="{FF2B5EF4-FFF2-40B4-BE49-F238E27FC236}">
-                <a16:creationId xmlns:a16="http://schemas.microsoft.com/office/drawing/2014/main" id="{BE408F52-7DB8-8E4E-9ED7-EDB401D5E322}"/>
-              </a:ext>
-            </a:extLst>
-          </p:cNvPr>
-          <p:cNvSpPr txBox="1"/>
-          <p:nvPr/>
-        </p:nvSpPr>
-        <p:spPr>
-          <a:xfrm>
-            <a:off x="5120734" y="-86657"/>
-            <a:ext cx="805912" cy="523220"/>
-          </a:xfrm>
-          <a:prstGeom prst="rect">
-            <a:avLst/>
-          </a:prstGeom>
-          <a:noFill/>
-        </p:spPr>
-        <p:txBody>
-          <a:bodyPr wrap="square" rtlCol="0">
-            <a:spAutoFit/>
-          </a:bodyPr>
-          <a:lstStyle/>
-          <a:p>
-            <a:r>
-              <a:rPr lang="en-US" sz="2800" b="1" dirty="0"/>
-              <a:t>B</a:t>
-            </a:r>
-          </a:p>
-        </p:txBody>
-      </p:sp>
     </p:spTree>
     <p:extLst>
       <p:ext uri="{BB962C8B-B14F-4D97-AF65-F5344CB8AC3E}">

</xml_diff>